<commit_message>
Fix diagrams for model class, logic sequence and add task sequence (#166)
</commit_message>
<xml_diff>
--- a/docs/diagrams/AddTaskSequenceDiagram.pptx
+++ b/docs/diagrams/AddTaskSequenceDiagram.pptx
@@ -208,7 +208,7 @@
           <a:p>
             <a:fld id="{F5CC4B3F-88C1-4FFA-B1B6-F41C21DC6924}" type="datetimeFigureOut">
               <a:rPr lang="en-US" smtClean="0"/>
-              <a:t>10/31/2018</a:t>
+              <a:t>11/11/2018</a:t>
             </a:fld>
             <a:endParaRPr lang="en-US"/>
           </a:p>
@@ -738,7 +738,7 @@
           <a:p>
             <a:fld id="{78C97017-6FC3-485B-9764-EAC9E56C1D49}" type="datetimeFigureOut">
               <a:rPr lang="en-US" smtClean="0"/>
-              <a:t>10/31/2018</a:t>
+              <a:t>11/11/2018</a:t>
             </a:fld>
             <a:endParaRPr lang="en-US"/>
           </a:p>
@@ -906,7 +906,7 @@
           <a:p>
             <a:fld id="{78C97017-6FC3-485B-9764-EAC9E56C1D49}" type="datetimeFigureOut">
               <a:rPr lang="en-US" smtClean="0"/>
-              <a:t>10/31/2018</a:t>
+              <a:t>11/11/2018</a:t>
             </a:fld>
             <a:endParaRPr lang="en-US"/>
           </a:p>
@@ -1084,7 +1084,7 @@
           <a:p>
             <a:fld id="{78C97017-6FC3-485B-9764-EAC9E56C1D49}" type="datetimeFigureOut">
               <a:rPr lang="en-US" smtClean="0"/>
-              <a:t>10/31/2018</a:t>
+              <a:t>11/11/2018</a:t>
             </a:fld>
             <a:endParaRPr lang="en-US"/>
           </a:p>
@@ -1252,7 +1252,7 @@
           <a:p>
             <a:fld id="{78C97017-6FC3-485B-9764-EAC9E56C1D49}" type="datetimeFigureOut">
               <a:rPr lang="en-US" smtClean="0"/>
-              <a:t>10/31/2018</a:t>
+              <a:t>11/11/2018</a:t>
             </a:fld>
             <a:endParaRPr lang="en-US"/>
           </a:p>
@@ -1497,7 +1497,7 @@
           <a:p>
             <a:fld id="{78C97017-6FC3-485B-9764-EAC9E56C1D49}" type="datetimeFigureOut">
               <a:rPr lang="en-US" smtClean="0"/>
-              <a:t>10/31/2018</a:t>
+              <a:t>11/11/2018</a:t>
             </a:fld>
             <a:endParaRPr lang="en-US"/>
           </a:p>
@@ -1782,7 +1782,7 @@
           <a:p>
             <a:fld id="{78C97017-6FC3-485B-9764-EAC9E56C1D49}" type="datetimeFigureOut">
               <a:rPr lang="en-US" smtClean="0"/>
-              <a:t>10/31/2018</a:t>
+              <a:t>11/11/2018</a:t>
             </a:fld>
             <a:endParaRPr lang="en-US"/>
           </a:p>
@@ -2201,7 +2201,7 @@
           <a:p>
             <a:fld id="{78C97017-6FC3-485B-9764-EAC9E56C1D49}" type="datetimeFigureOut">
               <a:rPr lang="en-US" smtClean="0"/>
-              <a:t>10/31/2018</a:t>
+              <a:t>11/11/2018</a:t>
             </a:fld>
             <a:endParaRPr lang="en-US"/>
           </a:p>
@@ -2318,7 +2318,7 @@
           <a:p>
             <a:fld id="{78C97017-6FC3-485B-9764-EAC9E56C1D49}" type="datetimeFigureOut">
               <a:rPr lang="en-US" smtClean="0"/>
-              <a:t>10/31/2018</a:t>
+              <a:t>11/11/2018</a:t>
             </a:fld>
             <a:endParaRPr lang="en-US"/>
           </a:p>
@@ -2413,7 +2413,7 @@
           <a:p>
             <a:fld id="{78C97017-6FC3-485B-9764-EAC9E56C1D49}" type="datetimeFigureOut">
               <a:rPr lang="en-US" smtClean="0"/>
-              <a:t>10/31/2018</a:t>
+              <a:t>11/11/2018</a:t>
             </a:fld>
             <a:endParaRPr lang="en-US"/>
           </a:p>
@@ -2688,7 +2688,7 @@
           <a:p>
             <a:fld id="{78C97017-6FC3-485B-9764-EAC9E56C1D49}" type="datetimeFigureOut">
               <a:rPr lang="en-US" smtClean="0"/>
-              <a:t>10/31/2018</a:t>
+              <a:t>11/11/2018</a:t>
             </a:fld>
             <a:endParaRPr lang="en-US"/>
           </a:p>
@@ -2940,7 +2940,7 @@
           <a:p>
             <a:fld id="{78C97017-6FC3-485B-9764-EAC9E56C1D49}" type="datetimeFigureOut">
               <a:rPr lang="en-US" smtClean="0"/>
-              <a:t>10/31/2018</a:t>
+              <a:t>11/11/2018</a:t>
             </a:fld>
             <a:endParaRPr lang="en-US"/>
           </a:p>
@@ -3151,7 +3151,7 @@
           <a:p>
             <a:fld id="{78C97017-6FC3-485B-9764-EAC9E56C1D49}" type="datetimeFigureOut">
               <a:rPr lang="en-US" smtClean="0"/>
-              <a:t>10/31/2018</a:t>
+              <a:t>11/11/2018</a:t>
             </a:fld>
             <a:endParaRPr lang="en-US"/>
           </a:p>
@@ -3534,7 +3534,7 @@
         </p:nvSpPr>
         <p:spPr>
           <a:xfrm>
-            <a:off x="-558548" y="-266958"/>
+            <a:off x="-482347" y="-266958"/>
             <a:ext cx="13893547" cy="7963158"/>
           </a:xfrm>
           <a:prstGeom prst="roundRect">
@@ -4424,8 +4424,8 @@
         </p:nvCxnSpPr>
         <p:spPr>
           <a:xfrm>
-            <a:off x="8235860" y="802478"/>
-            <a:ext cx="19070" cy="6665122"/>
+            <a:off x="8248560" y="802478"/>
+            <a:ext cx="1991" cy="1914787"/>
           </a:xfrm>
           <a:prstGeom prst="line">
             <a:avLst/>
@@ -4522,8 +4522,8 @@
         </p:nvCxnSpPr>
         <p:spPr>
           <a:xfrm flipH="1">
-            <a:off x="10744477" y="807590"/>
-            <a:ext cx="18832" cy="6583810"/>
+            <a:off x="10728895" y="807590"/>
+            <a:ext cx="2664" cy="2640460"/>
           </a:xfrm>
           <a:prstGeom prst="line">
             <a:avLst/>
@@ -4903,9 +4903,9 @@
           <p:nvPr/>
         </p:nvCxnSpPr>
         <p:spPr>
-          <a:xfrm>
-            <a:off x="4289353" y="600923"/>
-            <a:ext cx="0" cy="6790477"/>
+          <a:xfrm flipH="1">
+            <a:off x="4287520" y="588223"/>
+            <a:ext cx="5080" cy="834177"/>
           </a:xfrm>
           <a:prstGeom prst="line">
             <a:avLst/>
@@ -5276,9 +5276,9 @@
           <p:nvPr/>
         </p:nvCxnSpPr>
         <p:spPr>
-          <a:xfrm>
-            <a:off x="3341208" y="1955625"/>
-            <a:ext cx="0" cy="5511975"/>
+          <a:xfrm flipH="1">
+            <a:off x="3340100" y="1955625"/>
+            <a:ext cx="1108" cy="1492425"/>
           </a:xfrm>
           <a:prstGeom prst="line">
             <a:avLst/>
@@ -5417,8 +5417,8 @@
         </p:nvCxnSpPr>
         <p:spPr>
           <a:xfrm>
-            <a:off x="5838524" y="1247447"/>
-            <a:ext cx="12953" cy="6210528"/>
+            <a:off x="5838525" y="1247447"/>
+            <a:ext cx="16175" cy="4213553"/>
           </a:xfrm>
           <a:prstGeom prst="line">
             <a:avLst/>
@@ -5462,7 +5462,7 @@
         </p:nvCxnSpPr>
         <p:spPr>
           <a:xfrm>
-            <a:off x="4433561" y="1257072"/>
+            <a:off x="4433561" y="1247547"/>
             <a:ext cx="1329076" cy="7849"/>
           </a:xfrm>
           <a:prstGeom prst="straightConnector1">
@@ -5680,7 +5680,7 @@
         <p:spPr>
           <a:xfrm>
             <a:off x="6631770" y="4012598"/>
-            <a:ext cx="17139" cy="3445377"/>
+            <a:ext cx="0" cy="796209"/>
           </a:xfrm>
           <a:prstGeom prst="line">
             <a:avLst/>
@@ -5837,13 +5837,14 @@
           </p:cNvPr>
           <p:cNvCxnSpPr>
             <a:cxnSpLocks/>
+            <a:stCxn id="134" idx="2"/>
           </p:cNvCxnSpPr>
           <p:nvPr/>
         </p:nvCxnSpPr>
         <p:spPr>
-          <a:xfrm>
-            <a:off x="7575656" y="5403093"/>
-            <a:ext cx="7743" cy="1988307"/>
+          <a:xfrm flipH="1">
+            <a:off x="7575657" y="5357283"/>
+            <a:ext cx="3944" cy="776990"/>
           </a:xfrm>
           <a:prstGeom prst="line">
             <a:avLst/>
@@ -6503,9 +6504,9 @@
           <p:nvPr/>
         </p:nvCxnSpPr>
         <p:spPr>
-          <a:xfrm flipV="1">
-            <a:off x="5975350" y="5165811"/>
-            <a:ext cx="1149522" cy="7322"/>
+          <a:xfrm>
+            <a:off x="5949950" y="5165725"/>
+            <a:ext cx="1174922" cy="87"/>
           </a:xfrm>
           <a:prstGeom prst="straightConnector1">
             <a:avLst/>
@@ -6545,9 +6546,9 @@
           <p:nvPr/>
         </p:nvCxnSpPr>
         <p:spPr>
-          <a:xfrm flipV="1">
-            <a:off x="5973233" y="5353050"/>
-            <a:ext cx="1545167" cy="4233"/>
+          <a:xfrm>
+            <a:off x="5948680" y="5349240"/>
+            <a:ext cx="1569720" cy="3811"/>
           </a:xfrm>
           <a:prstGeom prst="straightConnector1">
             <a:avLst/>
@@ -6866,7 +6867,7 @@
         <p:spPr>
           <a:xfrm>
             <a:off x="12691628" y="653957"/>
-            <a:ext cx="0" cy="6585043"/>
+            <a:ext cx="0" cy="6127843"/>
           </a:xfrm>
           <a:prstGeom prst="line">
             <a:avLst/>
@@ -7129,6 +7130,150 @@
               <a:t>startDateTime</a:t>
             </a:r>
             <a:endParaRPr lang="en-US" sz="1600" dirty="0"/>
+          </a:p>
+        </p:txBody>
+      </p:sp>
+      <p:sp>
+        <p:nvSpPr>
+          <p:cNvPr id="80" name="TextBox 79">
+            <a:extLst>
+              <a:ext uri="{FF2B5EF4-FFF2-40B4-BE49-F238E27FC236}">
+                <a16:creationId xmlns:a16="http://schemas.microsoft.com/office/drawing/2014/main" id="{4FA0D9EB-571A-46C9-AF3E-3EAE922067C2}"/>
+              </a:ext>
+            </a:extLst>
+          </p:cNvPr>
+          <p:cNvSpPr txBox="1"/>
+          <p:nvPr/>
+        </p:nvSpPr>
+        <p:spPr>
+          <a:xfrm>
+            <a:off x="3277658" y="3317372"/>
+            <a:ext cx="124884" cy="261610"/>
+          </a:xfrm>
+          <a:prstGeom prst="rect">
+            <a:avLst/>
+          </a:prstGeom>
+          <a:noFill/>
+        </p:spPr>
+        <p:txBody>
+          <a:bodyPr wrap="square" rtlCol="0">
+            <a:spAutoFit/>
+          </a:bodyPr>
+          <a:lstStyle/>
+          <a:p>
+            <a:pPr algn="ctr"/>
+            <a:r>
+              <a:rPr lang="en-SG" sz="1100" dirty="0"/>
+              <a:t>X</a:t>
+            </a:r>
+          </a:p>
+        </p:txBody>
+      </p:sp>
+      <p:sp>
+        <p:nvSpPr>
+          <p:cNvPr id="84" name="TextBox 83">
+            <a:extLst>
+              <a:ext uri="{FF2B5EF4-FFF2-40B4-BE49-F238E27FC236}">
+                <a16:creationId xmlns:a16="http://schemas.microsoft.com/office/drawing/2014/main" id="{6AC960BF-0A9F-49FC-BE9A-C4C1B60829FF}"/>
+              </a:ext>
+            </a:extLst>
+          </p:cNvPr>
+          <p:cNvSpPr txBox="1"/>
+          <p:nvPr/>
+        </p:nvSpPr>
+        <p:spPr>
+          <a:xfrm>
+            <a:off x="5791200" y="5337707"/>
+            <a:ext cx="124884" cy="261610"/>
+          </a:xfrm>
+          <a:prstGeom prst="rect">
+            <a:avLst/>
+          </a:prstGeom>
+          <a:noFill/>
+        </p:spPr>
+        <p:txBody>
+          <a:bodyPr wrap="square" rtlCol="0">
+            <a:spAutoFit/>
+          </a:bodyPr>
+          <a:lstStyle/>
+          <a:p>
+            <a:pPr algn="ctr"/>
+            <a:r>
+              <a:rPr lang="en-SG" sz="1100" dirty="0"/>
+              <a:t>X</a:t>
+            </a:r>
+          </a:p>
+        </p:txBody>
+      </p:sp>
+      <p:sp>
+        <p:nvSpPr>
+          <p:cNvPr id="111" name="TextBox 110">
+            <a:extLst>
+              <a:ext uri="{FF2B5EF4-FFF2-40B4-BE49-F238E27FC236}">
+                <a16:creationId xmlns:a16="http://schemas.microsoft.com/office/drawing/2014/main" id="{F0192EB1-1CC5-42F5-A4A1-9C58C671F4E3}"/>
+              </a:ext>
+            </a:extLst>
+          </p:cNvPr>
+          <p:cNvSpPr txBox="1"/>
+          <p:nvPr/>
+        </p:nvSpPr>
+        <p:spPr>
+          <a:xfrm>
+            <a:off x="7515642" y="6022526"/>
+            <a:ext cx="124884" cy="261610"/>
+          </a:xfrm>
+          <a:prstGeom prst="rect">
+            <a:avLst/>
+          </a:prstGeom>
+          <a:noFill/>
+        </p:spPr>
+        <p:txBody>
+          <a:bodyPr wrap="square" rtlCol="0">
+            <a:spAutoFit/>
+          </a:bodyPr>
+          <a:lstStyle/>
+          <a:p>
+            <a:pPr algn="ctr"/>
+            <a:r>
+              <a:rPr lang="en-SG" sz="1100" dirty="0"/>
+              <a:t>X</a:t>
+            </a:r>
+          </a:p>
+        </p:txBody>
+      </p:sp>
+      <p:sp>
+        <p:nvSpPr>
+          <p:cNvPr id="112" name="TextBox 111">
+            <a:extLst>
+              <a:ext uri="{FF2B5EF4-FFF2-40B4-BE49-F238E27FC236}">
+                <a16:creationId xmlns:a16="http://schemas.microsoft.com/office/drawing/2014/main" id="{1BD7C126-F676-4EDD-A4C1-37DE1CE1EB09}"/>
+              </a:ext>
+            </a:extLst>
+          </p:cNvPr>
+          <p:cNvSpPr txBox="1"/>
+          <p:nvPr/>
+        </p:nvSpPr>
+        <p:spPr>
+          <a:xfrm>
+            <a:off x="6560544" y="4678002"/>
+            <a:ext cx="124884" cy="261610"/>
+          </a:xfrm>
+          <a:prstGeom prst="rect">
+            <a:avLst/>
+          </a:prstGeom>
+          <a:noFill/>
+        </p:spPr>
+        <p:txBody>
+          <a:bodyPr wrap="square" rtlCol="0">
+            <a:spAutoFit/>
+          </a:bodyPr>
+          <a:lstStyle/>
+          <a:p>
+            <a:pPr algn="ctr"/>
+            <a:r>
+              <a:rPr lang="en-SG" sz="1100" dirty="0"/>
+              <a:t>X</a:t>
+            </a:r>
           </a:p>
         </p:txBody>
       </p:sp>

</xml_diff>

<commit_message>
Add project portfolio for zxjtan (#167)
</commit_message>
<xml_diff>
--- a/docs/diagrams/AddTaskSequenceDiagram.pptx
+++ b/docs/diagrams/AddTaskSequenceDiagram.pptx
@@ -4100,9 +4100,9 @@
           <p:nvPr/>
         </p:nvCxnSpPr>
         <p:spPr>
-          <a:xfrm>
-            <a:off x="2184116" y="1563362"/>
-            <a:ext cx="531832" cy="0"/>
+          <a:xfrm flipV="1">
+            <a:off x="2162175" y="1555750"/>
+            <a:ext cx="574675" cy="3175"/>
           </a:xfrm>
           <a:prstGeom prst="straightConnector1">
             <a:avLst/>
@@ -4142,9 +4142,9 @@
           <p:nvPr/>
         </p:nvCxnSpPr>
         <p:spPr>
-          <a:xfrm>
-            <a:off x="2197446" y="2119000"/>
-            <a:ext cx="1067562" cy="0"/>
+          <a:xfrm flipV="1">
+            <a:off x="2171700" y="2119000"/>
+            <a:ext cx="1093308" cy="1900"/>
           </a:xfrm>
           <a:prstGeom prst="straightConnector1">
             <a:avLst/>
@@ -4467,8 +4467,8 @@
         </p:nvSpPr>
         <p:spPr>
           <a:xfrm>
-            <a:off x="8164842" y="2309748"/>
-            <a:ext cx="180177" cy="288781"/>
+            <a:off x="8164842" y="2311401"/>
+            <a:ext cx="180177" cy="285476"/>
           </a:xfrm>
           <a:prstGeom prst="rect">
             <a:avLst/>
@@ -4567,8 +4567,8 @@
         </p:nvCxnSpPr>
         <p:spPr>
           <a:xfrm flipV="1">
-            <a:off x="2197446" y="2300048"/>
-            <a:ext cx="5979331" cy="9701"/>
+            <a:off x="2159000" y="2315924"/>
+            <a:ext cx="6017777" cy="5001"/>
           </a:xfrm>
           <a:prstGeom prst="straightConnector1">
             <a:avLst/>
@@ -4707,8 +4707,8 @@
         </p:nvSpPr>
         <p:spPr>
           <a:xfrm>
-            <a:off x="10669994" y="3021647"/>
-            <a:ext cx="152399" cy="324430"/>
+            <a:off x="10669994" y="3013075"/>
+            <a:ext cx="152399" cy="333002"/>
           </a:xfrm>
           <a:prstGeom prst="rect">
             <a:avLst/>
@@ -4761,9 +4761,9 @@
           <p:nvPr/>
         </p:nvCxnSpPr>
         <p:spPr>
-          <a:xfrm>
-            <a:off x="2197446" y="3021647"/>
-            <a:ext cx="8472548" cy="0"/>
+          <a:xfrm flipV="1">
+            <a:off x="2165350" y="3022600"/>
+            <a:ext cx="8518525" cy="3175"/>
           </a:xfrm>
           <a:prstGeom prst="straightConnector1">
             <a:avLst/>
@@ -4858,8 +4858,8 @@
         </p:nvCxnSpPr>
         <p:spPr>
           <a:xfrm>
-            <a:off x="2184116" y="3352800"/>
-            <a:ext cx="8485878" cy="0"/>
+            <a:off x="2164291" y="3335866"/>
+            <a:ext cx="8504644" cy="6350"/>
           </a:xfrm>
           <a:prstGeom prst="straightConnector1">
             <a:avLst/>
@@ -5001,9 +5001,9 @@
           <p:nvPr/>
         </p:nvCxnSpPr>
         <p:spPr>
-          <a:xfrm>
-            <a:off x="2200311" y="963819"/>
-            <a:ext cx="2012854" cy="0"/>
+          <a:xfrm flipV="1">
+            <a:off x="2167466" y="971550"/>
+            <a:ext cx="2053167" cy="4234"/>
           </a:xfrm>
           <a:prstGeom prst="straightConnector1">
             <a:avLst/>
@@ -5930,8 +5930,8 @@
         </p:nvCxnSpPr>
         <p:spPr>
           <a:xfrm>
-            <a:off x="2184116" y="4056297"/>
-            <a:ext cx="3621952" cy="0"/>
+            <a:off x="2168525" y="4032250"/>
+            <a:ext cx="3637543" cy="1822"/>
           </a:xfrm>
           <a:prstGeom prst="straightConnector1">
             <a:avLst/>
@@ -6271,7 +6271,7 @@
         <p:spPr>
           <a:xfrm>
             <a:off x="2133600" y="4394709"/>
-            <a:ext cx="4410075" cy="2666"/>
+            <a:ext cx="4415367" cy="3724"/>
           </a:xfrm>
           <a:prstGeom prst="straightConnector1">
             <a:avLst/>
@@ -6459,7 +6459,7 @@
         </p:nvCxnSpPr>
         <p:spPr>
           <a:xfrm>
-            <a:off x="5970442" y="4010578"/>
+            <a:off x="5967267" y="3991528"/>
             <a:ext cx="599290" cy="0"/>
           </a:xfrm>
           <a:prstGeom prst="straightConnector1">
@@ -6591,8 +6591,8 @@
         </p:nvSpPr>
         <p:spPr>
           <a:xfrm>
-            <a:off x="7505357" y="5709632"/>
-            <a:ext cx="142420" cy="302791"/>
+            <a:off x="7505357" y="5723467"/>
+            <a:ext cx="142420" cy="288956"/>
           </a:xfrm>
           <a:prstGeom prst="rect">
             <a:avLst/>
@@ -6646,8 +6646,8 @@
         </p:nvCxnSpPr>
         <p:spPr>
           <a:xfrm flipV="1">
-            <a:off x="2155711" y="5723467"/>
-            <a:ext cx="5349989" cy="4380"/>
+            <a:off x="2155711" y="5727700"/>
+            <a:ext cx="5360572" cy="148"/>
           </a:xfrm>
           <a:prstGeom prst="straightConnector1">
             <a:avLst/>
@@ -6733,7 +6733,7 @@
         </p:nvSpPr>
         <p:spPr>
           <a:xfrm>
-            <a:off x="4733599" y="5463411"/>
+            <a:off x="4648200" y="5468779"/>
             <a:ext cx="2729330" cy="246221"/>
           </a:xfrm>
           <a:prstGeom prst="rect">
@@ -6909,8 +6909,8 @@
         </p:nvSpPr>
         <p:spPr>
           <a:xfrm>
-            <a:off x="12615428" y="6315545"/>
-            <a:ext cx="152399" cy="324430"/>
+            <a:off x="12615428" y="6305550"/>
+            <a:ext cx="152399" cy="346075"/>
           </a:xfrm>
           <a:prstGeom prst="rect">
             <a:avLst/>
@@ -6964,8 +6964,8 @@
         </p:nvCxnSpPr>
         <p:spPr>
           <a:xfrm>
-            <a:off x="2197446" y="6315545"/>
-            <a:ext cx="10417982" cy="0"/>
+            <a:off x="2150533" y="6311900"/>
+            <a:ext cx="10479617" cy="3175"/>
           </a:xfrm>
           <a:prstGeom prst="straightConnector1">
             <a:avLst/>
@@ -7056,8 +7056,8 @@
         </p:nvCxnSpPr>
         <p:spPr>
           <a:xfrm>
-            <a:off x="2197446" y="6639975"/>
-            <a:ext cx="10417982" cy="6723"/>
+            <a:off x="2148840" y="6644640"/>
+            <a:ext cx="10466588" cy="2058"/>
           </a:xfrm>
           <a:prstGeom prst="straightConnector1">
             <a:avLst/>

</xml_diff>